<commit_message>
code cleaned and commented; repo cleaned
</commit_message>
<xml_diff>
--- a/Presentation/project_03_group_04.pptx
+++ b/Presentation/project_03_group_04.pptx
@@ -206,7 +206,7 @@
           <a:p>
             <a:fld id="{8488FA59-3C1F-4DE7-BF14-78DE5633DE13}" type="datetimeFigureOut">
               <a:rPr lang="en-US" smtClean="0"/>
-              <a:t>6/26/2023</a:t>
+              <a:t>6/27/2023</a:t>
             </a:fld>
             <a:endParaRPr lang="en-US" dirty="0"/>
           </a:p>
@@ -702,7 +702,7 @@
           <a:p>
             <a:fld id="{91481E19-E948-4164-9738-9EF63BEDDA24}" type="datetimeFigureOut">
               <a:rPr lang="en-US" smtClean="0"/>
-              <a:t>6/26/2023</a:t>
+              <a:t>6/27/2023</a:t>
             </a:fld>
             <a:endParaRPr lang="en-US" dirty="0"/>
           </a:p>
@@ -1035,7 +1035,7 @@
           <a:p>
             <a:fld id="{91481E19-E948-4164-9738-9EF63BEDDA24}" type="datetimeFigureOut">
               <a:rPr lang="en-US" smtClean="0"/>
-              <a:t>6/26/2023</a:t>
+              <a:t>6/27/2023</a:t>
             </a:fld>
             <a:endParaRPr lang="en-US" dirty="0"/>
           </a:p>
@@ -1313,7 +1313,7 @@
           <a:p>
             <a:fld id="{91481E19-E948-4164-9738-9EF63BEDDA24}" type="datetimeFigureOut">
               <a:rPr lang="en-US" smtClean="0"/>
-              <a:t>6/26/2023</a:t>
+              <a:t>6/27/2023</a:t>
             </a:fld>
             <a:endParaRPr lang="en-US" dirty="0"/>
           </a:p>
@@ -1881,7 +1881,7 @@
           <a:p>
             <a:fld id="{91481E19-E948-4164-9738-9EF63BEDDA24}" type="datetimeFigureOut">
               <a:rPr lang="en-US" smtClean="0"/>
-              <a:t>6/26/2023</a:t>
+              <a:t>6/27/2023</a:t>
             </a:fld>
             <a:endParaRPr lang="en-US" dirty="0"/>
           </a:p>
@@ -2159,7 +2159,7 @@
           <a:p>
             <a:fld id="{91481E19-E948-4164-9738-9EF63BEDDA24}" type="datetimeFigureOut">
               <a:rPr lang="en-US" smtClean="0"/>
-              <a:t>6/26/2023</a:t>
+              <a:t>6/27/2023</a:t>
             </a:fld>
             <a:endParaRPr lang="en-US" dirty="0"/>
           </a:p>
@@ -2721,7 +2721,7 @@
           <a:p>
             <a:fld id="{91481E19-E948-4164-9738-9EF63BEDDA24}" type="datetimeFigureOut">
               <a:rPr lang="en-US" smtClean="0"/>
-              <a:t>6/26/2023</a:t>
+              <a:t>6/27/2023</a:t>
             </a:fld>
             <a:endParaRPr lang="en-US" dirty="0"/>
           </a:p>
@@ -3048,7 +3048,7 @@
           <a:p>
             <a:fld id="{91481E19-E948-4164-9738-9EF63BEDDA24}" type="datetimeFigureOut">
               <a:rPr lang="en-US" smtClean="0"/>
-              <a:t>6/26/2023</a:t>
+              <a:t>6/27/2023</a:t>
             </a:fld>
             <a:endParaRPr lang="en-US" dirty="0"/>
           </a:p>
@@ -3225,7 +3225,7 @@
           <a:p>
             <a:fld id="{91481E19-E948-4164-9738-9EF63BEDDA24}" type="datetimeFigureOut">
               <a:rPr lang="en-US" smtClean="0"/>
-              <a:t>6/26/2023</a:t>
+              <a:t>6/27/2023</a:t>
             </a:fld>
             <a:endParaRPr lang="en-US" dirty="0"/>
           </a:p>
@@ -3463,7 +3463,7 @@
           <a:p>
             <a:fld id="{91481E19-E948-4164-9738-9EF63BEDDA24}" type="datetimeFigureOut">
               <a:rPr lang="en-US" smtClean="0"/>
-              <a:t>6/26/2023</a:t>
+              <a:t>6/27/2023</a:t>
             </a:fld>
             <a:endParaRPr lang="en-US" dirty="0"/>
           </a:p>
@@ -3663,7 +3663,7 @@
           <a:p>
             <a:fld id="{91481E19-E948-4164-9738-9EF63BEDDA24}" type="datetimeFigureOut">
               <a:rPr lang="en-US" smtClean="0"/>
-              <a:t>6/26/2023</a:t>
+              <a:t>6/27/2023</a:t>
             </a:fld>
             <a:endParaRPr lang="en-US" dirty="0"/>
           </a:p>
@@ -3939,7 +3939,7 @@
           <a:p>
             <a:fld id="{91481E19-E948-4164-9738-9EF63BEDDA24}" type="datetimeFigureOut">
               <a:rPr lang="en-US" smtClean="0"/>
-              <a:t>6/26/2023</a:t>
+              <a:t>6/27/2023</a:t>
             </a:fld>
             <a:endParaRPr lang="en-US" dirty="0"/>
           </a:p>
@@ -4205,7 +4205,7 @@
           <a:p>
             <a:fld id="{91481E19-E948-4164-9738-9EF63BEDDA24}" type="datetimeFigureOut">
               <a:rPr lang="en-US" smtClean="0"/>
-              <a:t>6/26/2023</a:t>
+              <a:t>6/27/2023</a:t>
             </a:fld>
             <a:endParaRPr lang="en-US" dirty="0"/>
           </a:p>
@@ -4579,7 +4579,7 @@
           <a:p>
             <a:fld id="{91481E19-E948-4164-9738-9EF63BEDDA24}" type="datetimeFigureOut">
               <a:rPr lang="en-US" smtClean="0"/>
-              <a:t>6/26/2023</a:t>
+              <a:t>6/27/2023</a:t>
             </a:fld>
             <a:endParaRPr lang="en-US" dirty="0"/>
           </a:p>
@@ -4727,7 +4727,7 @@
           <a:p>
             <a:fld id="{91481E19-E948-4164-9738-9EF63BEDDA24}" type="datetimeFigureOut">
               <a:rPr lang="en-US" smtClean="0"/>
-              <a:t>6/26/2023</a:t>
+              <a:t>6/27/2023</a:t>
             </a:fld>
             <a:endParaRPr lang="en-US" dirty="0"/>
           </a:p>
@@ -4852,7 +4852,7 @@
           <a:p>
             <a:fld id="{91481E19-E948-4164-9738-9EF63BEDDA24}" type="datetimeFigureOut">
               <a:rPr lang="en-US" smtClean="0"/>
-              <a:t>6/26/2023</a:t>
+              <a:t>6/27/2023</a:t>
             </a:fld>
             <a:endParaRPr lang="en-US" dirty="0"/>
           </a:p>
@@ -5137,7 +5137,7 @@
           <a:p>
             <a:fld id="{91481E19-E948-4164-9738-9EF63BEDDA24}" type="datetimeFigureOut">
               <a:rPr lang="en-US" smtClean="0"/>
-              <a:t>6/26/2023</a:t>
+              <a:t>6/27/2023</a:t>
             </a:fld>
             <a:endParaRPr lang="en-US" dirty="0"/>
           </a:p>
@@ -5460,7 +5460,7 @@
           <a:p>
             <a:fld id="{91481E19-E948-4164-9738-9EF63BEDDA24}" type="datetimeFigureOut">
               <a:rPr lang="en-US" smtClean="0"/>
-              <a:t>6/26/2023</a:t>
+              <a:t>6/27/2023</a:t>
             </a:fld>
             <a:endParaRPr lang="en-US" dirty="0"/>
           </a:p>
@@ -5674,7 +5674,7 @@
           <a:p>
             <a:fld id="{91481E19-E948-4164-9738-9EF63BEDDA24}" type="datetimeFigureOut">
               <a:rPr lang="en-US" smtClean="0"/>
-              <a:t>6/26/2023</a:t>
+              <a:t>6/27/2023</a:t>
             </a:fld>
             <a:endParaRPr lang="en-US" dirty="0"/>
           </a:p>
@@ -6459,10 +6459,73 @@
           <a:p>
             <a:pPr algn="ctr"/>
             <a:r>
-              <a:rPr lang="en-US" sz="6600" dirty="0"/>
+              <a:rPr lang="en-US" sz="6600" dirty="0">
+                <a:solidFill>
+                  <a:srgbClr val="FFC000"/>
+                </a:solidFill>
+              </a:rPr>
               <a:t>Bonus.js</a:t>
             </a:r>
-            <a:endParaRPr lang="en-US" sz="3200" dirty="0"/>
+            <a:endParaRPr lang="en-US" sz="3200" dirty="0">
+              <a:solidFill>
+                <a:srgbClr val="FFC000"/>
+              </a:solidFill>
+            </a:endParaRPr>
+          </a:p>
+        </p:txBody>
+      </p:sp>
+      <p:sp>
+        <p:nvSpPr>
+          <p:cNvPr id="2" name="Rectangle: Rounded Corners 1">
+            <a:extLst>
+              <a:ext uri="{FF2B5EF4-FFF2-40B4-BE49-F238E27FC236}">
+                <a16:creationId xmlns:a16="http://schemas.microsoft.com/office/drawing/2014/main" id="{5892CF2B-4BBE-97C1-F896-B3E83FDD1B3D}"/>
+              </a:ext>
+            </a:extLst>
+          </p:cNvPr>
+          <p:cNvSpPr/>
+          <p:nvPr/>
+        </p:nvSpPr>
+        <p:spPr>
+          <a:xfrm>
+            <a:off x="4659906" y="5460763"/>
+            <a:ext cx="2872187" cy="811900"/>
+          </a:xfrm>
+          <a:prstGeom prst="roundRect">
+            <a:avLst/>
+          </a:prstGeom>
+          <a:noFill/>
+        </p:spPr>
+        <p:style>
+          <a:lnRef idx="2">
+            <a:schemeClr val="accent1">
+              <a:shade val="50000"/>
+            </a:schemeClr>
+          </a:lnRef>
+          <a:fillRef idx="1">
+            <a:schemeClr val="accent1"/>
+          </a:fillRef>
+          <a:effectRef idx="0">
+            <a:schemeClr val="accent1"/>
+          </a:effectRef>
+          <a:fontRef idx="minor">
+            <a:schemeClr val="lt1"/>
+          </a:fontRef>
+        </p:style>
+        <p:txBody>
+          <a:bodyPr rtlCol="0" anchor="ctr"/>
+          <a:lstStyle/>
+          <a:p>
+            <a:pPr algn="ctr"/>
+            <a:r>
+              <a:rPr lang="en-US" sz="3200" dirty="0">
+                <a:solidFill>
+                  <a:srgbClr val="FFC000"/>
+                </a:solidFill>
+              </a:rPr>
+              <a:t>(then Q&amp;A)</a:t>
+            </a:r>
+            <a:endParaRPr lang="en-US" sz="1200" dirty="0"/>
           </a:p>
         </p:txBody>
       </p:sp>
@@ -6723,159 +6786,6 @@
       </p:sp>
       <p:sp>
         <p:nvSpPr>
-          <p:cNvPr id="8" name="Rectangle: Rounded Corners 7">
-            <a:extLst>
-              <a:ext uri="{FF2B5EF4-FFF2-40B4-BE49-F238E27FC236}">
-                <a16:creationId xmlns:a16="http://schemas.microsoft.com/office/drawing/2014/main" id="{6BD46EBE-7FFA-4B4D-6CD4-0F0CC19A17D9}"/>
-              </a:ext>
-            </a:extLst>
-          </p:cNvPr>
-          <p:cNvSpPr/>
-          <p:nvPr/>
-        </p:nvSpPr>
-        <p:spPr>
-          <a:xfrm>
-            <a:off x="1294142" y="2632104"/>
-            <a:ext cx="2517216" cy="890542"/>
-          </a:xfrm>
-          <a:prstGeom prst="roundRect">
-            <a:avLst/>
-          </a:prstGeom>
-          <a:noFill/>
-        </p:spPr>
-        <p:style>
-          <a:lnRef idx="2">
-            <a:schemeClr val="accent1">
-              <a:shade val="50000"/>
-            </a:schemeClr>
-          </a:lnRef>
-          <a:fillRef idx="1">
-            <a:schemeClr val="accent1"/>
-          </a:fillRef>
-          <a:effectRef idx="0">
-            <a:schemeClr val="accent1"/>
-          </a:effectRef>
-          <a:fontRef idx="minor">
-            <a:schemeClr val="lt1"/>
-          </a:fontRef>
-        </p:style>
-        <p:txBody>
-          <a:bodyPr rtlCol="0" anchor="ctr"/>
-          <a:lstStyle/>
-          <a:p>
-            <a:pPr algn="ctr"/>
-            <a:r>
-              <a:rPr lang="en-US" sz="4000" dirty="0"/>
-              <a:t>CDC csv</a:t>
-            </a:r>
-            <a:endParaRPr lang="en-US" sz="1600" dirty="0"/>
-          </a:p>
-        </p:txBody>
-      </p:sp>
-      <p:sp>
-        <p:nvSpPr>
-          <p:cNvPr id="9" name="Rectangle: Rounded Corners 8">
-            <a:extLst>
-              <a:ext uri="{FF2B5EF4-FFF2-40B4-BE49-F238E27FC236}">
-                <a16:creationId xmlns:a16="http://schemas.microsoft.com/office/drawing/2014/main" id="{468C298B-E6BB-0D79-25E7-672B190EE5E4}"/>
-              </a:ext>
-            </a:extLst>
-          </p:cNvPr>
-          <p:cNvSpPr/>
-          <p:nvPr/>
-        </p:nvSpPr>
-        <p:spPr>
-          <a:xfrm>
-            <a:off x="4615200" y="2632104"/>
-            <a:ext cx="2517216" cy="890542"/>
-          </a:xfrm>
-          <a:prstGeom prst="roundRect">
-            <a:avLst/>
-          </a:prstGeom>
-          <a:noFill/>
-        </p:spPr>
-        <p:style>
-          <a:lnRef idx="2">
-            <a:schemeClr val="accent1">
-              <a:shade val="50000"/>
-            </a:schemeClr>
-          </a:lnRef>
-          <a:fillRef idx="1">
-            <a:schemeClr val="accent1"/>
-          </a:fillRef>
-          <a:effectRef idx="0">
-            <a:schemeClr val="accent1"/>
-          </a:effectRef>
-          <a:fontRef idx="minor">
-            <a:schemeClr val="lt1"/>
-          </a:fontRef>
-        </p:style>
-        <p:txBody>
-          <a:bodyPr rtlCol="0" anchor="ctr"/>
-          <a:lstStyle/>
-          <a:p>
-            <a:pPr algn="ctr"/>
-            <a:r>
-              <a:rPr lang="en-US" sz="4000" dirty="0"/>
-              <a:t>JSON</a:t>
-            </a:r>
-            <a:endParaRPr lang="en-US" sz="1600" dirty="0"/>
-          </a:p>
-        </p:txBody>
-      </p:sp>
-      <p:sp>
-        <p:nvSpPr>
-          <p:cNvPr id="10" name="Rectangle: Rounded Corners 9">
-            <a:extLst>
-              <a:ext uri="{FF2B5EF4-FFF2-40B4-BE49-F238E27FC236}">
-                <a16:creationId xmlns:a16="http://schemas.microsoft.com/office/drawing/2014/main" id="{58382B44-7602-24A6-09B9-85D705F61B56}"/>
-              </a:ext>
-            </a:extLst>
-          </p:cNvPr>
-          <p:cNvSpPr/>
-          <p:nvPr/>
-        </p:nvSpPr>
-        <p:spPr>
-          <a:xfrm>
-            <a:off x="7936258" y="2632104"/>
-            <a:ext cx="2517216" cy="890542"/>
-          </a:xfrm>
-          <a:prstGeom prst="roundRect">
-            <a:avLst/>
-          </a:prstGeom>
-          <a:noFill/>
-        </p:spPr>
-        <p:style>
-          <a:lnRef idx="2">
-            <a:schemeClr val="accent1">
-              <a:shade val="50000"/>
-            </a:schemeClr>
-          </a:lnRef>
-          <a:fillRef idx="1">
-            <a:schemeClr val="accent1"/>
-          </a:fillRef>
-          <a:effectRef idx="0">
-            <a:schemeClr val="accent1"/>
-          </a:effectRef>
-          <a:fontRef idx="minor">
-            <a:schemeClr val="lt1"/>
-          </a:fontRef>
-        </p:style>
-        <p:txBody>
-          <a:bodyPr rtlCol="0" anchor="ctr"/>
-          <a:lstStyle/>
-          <a:p>
-            <a:pPr algn="ctr"/>
-            <a:r>
-              <a:rPr lang="en-US" sz="4000" dirty="0"/>
-              <a:t>MongoDB</a:t>
-            </a:r>
-            <a:endParaRPr lang="en-US" sz="1600" dirty="0"/>
-          </a:p>
-        </p:txBody>
-      </p:sp>
-      <p:sp>
-        <p:nvSpPr>
           <p:cNvPr id="11" name="Arrow: Right 10">
             <a:extLst>
               <a:ext uri="{FF2B5EF4-FFF2-40B4-BE49-F238E27FC236}">
@@ -6888,7 +6798,7 @@
         </p:nvSpPr>
         <p:spPr>
           <a:xfrm>
-            <a:off x="3944086" y="2859457"/>
+            <a:off x="3698030" y="2782426"/>
             <a:ext cx="538385" cy="435835"/>
           </a:xfrm>
           <a:prstGeom prst="rightArrow">
@@ -6934,7 +6844,7 @@
         </p:nvSpPr>
         <p:spPr>
           <a:xfrm>
-            <a:off x="7265144" y="2859456"/>
+            <a:off x="7927106" y="2782426"/>
             <a:ext cx="538385" cy="435835"/>
           </a:xfrm>
           <a:prstGeom prst="rightArrow">
@@ -6994,6 +6904,147 @@
           <a:prstGeom prst="rect">
             <a:avLst/>
           </a:prstGeom>
+        </p:spPr>
+      </p:pic>
+      <p:pic>
+        <p:nvPicPr>
+          <p:cNvPr id="1026" name="Picture 2" descr="csv&quot; Icon - Download for free – Iconduck">
+            <a:extLst>
+              <a:ext uri="{FF2B5EF4-FFF2-40B4-BE49-F238E27FC236}">
+                <a16:creationId xmlns:a16="http://schemas.microsoft.com/office/drawing/2014/main" id="{FC9120C2-B8AB-40E1-ED75-D6E6D8B635ED}"/>
+              </a:ext>
+            </a:extLst>
+          </p:cNvPr>
+          <p:cNvPicPr>
+            <a:picLocks noChangeAspect="1" noChangeArrowheads="1"/>
+          </p:cNvPicPr>
+          <p:nvPr/>
+        </p:nvPicPr>
+        <p:blipFill>
+          <a:blip r:embed="rId3">
+            <a:extLst>
+              <a:ext uri="{28A0092B-C50C-407E-A947-70E740481C1C}">
+                <a14:useLocalDpi xmlns:a14="http://schemas.microsoft.com/office/drawing/2010/main" val="0"/>
+              </a:ext>
+            </a:extLst>
+          </a:blip>
+          <a:srcRect/>
+          <a:stretch>
+            <a:fillRect/>
+          </a:stretch>
+        </p:blipFill>
+        <p:spPr bwMode="auto">
+          <a:xfrm>
+            <a:off x="1507456" y="1780076"/>
+            <a:ext cx="1754112" cy="2004700"/>
+          </a:xfrm>
+          <a:prstGeom prst="rect">
+            <a:avLst/>
+          </a:prstGeom>
+          <a:noFill/>
+          <a:extLst>
+            <a:ext uri="{909E8E84-426E-40DD-AFC4-6F175D3DCCD1}">
+              <a14:hiddenFill xmlns:a14="http://schemas.microsoft.com/office/drawing/2010/main">
+                <a:solidFill>
+                  <a:srgbClr val="FFFFFF"/>
+                </a:solidFill>
+              </a14:hiddenFill>
+            </a:ext>
+          </a:extLst>
+        </p:spPr>
+      </p:pic>
+      <p:pic>
+        <p:nvPicPr>
+          <p:cNvPr id="1028" name="Picture 4" descr="JSON Parsing in JAVA: Base of Analytics Testing In Automation">
+            <a:extLst>
+              <a:ext uri="{FF2B5EF4-FFF2-40B4-BE49-F238E27FC236}">
+                <a16:creationId xmlns:a16="http://schemas.microsoft.com/office/drawing/2014/main" id="{92AFD8B6-94BA-C312-CE0A-07DB3FC1830C}"/>
+              </a:ext>
+            </a:extLst>
+          </p:cNvPr>
+          <p:cNvPicPr>
+            <a:picLocks noChangeAspect="1" noChangeArrowheads="1"/>
+          </p:cNvPicPr>
+          <p:nvPr/>
+        </p:nvPicPr>
+        <p:blipFill>
+          <a:blip r:embed="rId4">
+            <a:extLst>
+              <a:ext uri="{28A0092B-C50C-407E-A947-70E740481C1C}">
+                <a14:useLocalDpi xmlns:a14="http://schemas.microsoft.com/office/drawing/2010/main" val="0"/>
+              </a:ext>
+            </a:extLst>
+          </a:blip>
+          <a:srcRect/>
+          <a:stretch>
+            <a:fillRect/>
+          </a:stretch>
+        </p:blipFill>
+        <p:spPr bwMode="auto">
+          <a:xfrm>
+            <a:off x="4574846" y="2445611"/>
+            <a:ext cx="3042303" cy="1117096"/>
+          </a:xfrm>
+          <a:prstGeom prst="rect">
+            <a:avLst/>
+          </a:prstGeom>
+          <a:noFill/>
+          <a:extLst>
+            <a:ext uri="{909E8E84-426E-40DD-AFC4-6F175D3DCCD1}">
+              <a14:hiddenFill xmlns:a14="http://schemas.microsoft.com/office/drawing/2010/main">
+                <a:solidFill>
+                  <a:srgbClr val="FFFFFF"/>
+                </a:solidFill>
+              </a14:hiddenFill>
+            </a:ext>
+          </a:extLst>
+        </p:spPr>
+      </p:pic>
+      <p:pic>
+        <p:nvPicPr>
+          <p:cNvPr id="1034" name="Picture 10" descr="Presentazione Aziendale - Mongo DB — Direzione aziendale - Laurea  Magistrale - Bologna">
+            <a:extLst>
+              <a:ext uri="{FF2B5EF4-FFF2-40B4-BE49-F238E27FC236}">
+                <a16:creationId xmlns:a16="http://schemas.microsoft.com/office/drawing/2014/main" id="{A89A8B8F-3D07-BCD7-CFDF-295151EF3DF3}"/>
+              </a:ext>
+            </a:extLst>
+          </p:cNvPr>
+          <p:cNvPicPr>
+            <a:picLocks noChangeAspect="1" noChangeArrowheads="1"/>
+          </p:cNvPicPr>
+          <p:nvPr/>
+        </p:nvPicPr>
+        <p:blipFill>
+          <a:blip r:embed="rId5">
+            <a:extLst>
+              <a:ext uri="{28A0092B-C50C-407E-A947-70E740481C1C}">
+                <a14:useLocalDpi xmlns:a14="http://schemas.microsoft.com/office/drawing/2010/main" val="0"/>
+              </a:ext>
+            </a:extLst>
+          </a:blip>
+          <a:srcRect/>
+          <a:stretch>
+            <a:fillRect/>
+          </a:stretch>
+        </p:blipFill>
+        <p:spPr bwMode="auto">
+          <a:xfrm>
+            <a:off x="8490073" y="1780076"/>
+            <a:ext cx="2114846" cy="2114846"/>
+          </a:xfrm>
+          <a:prstGeom prst="rect">
+            <a:avLst/>
+          </a:prstGeom>
+          <a:noFill/>
+          <a:extLst>
+            <a:ext uri="{909E8E84-426E-40DD-AFC4-6F175D3DCCD1}">
+              <a14:hiddenFill xmlns:a14="http://schemas.microsoft.com/office/drawing/2010/main">
+                <a:solidFill>
+                  <a:srgbClr val="FFFFFF"/>
+                </a:solidFill>
+              </a14:hiddenFill>
+            </a:ext>
+          </a:extLst>
         </p:spPr>
       </p:pic>
     </p:spTree>
@@ -7055,7 +7106,7 @@
             <a:pPr algn="ctr"/>
             <a:r>
               <a:rPr lang="en-US" dirty="0"/>
-              <a:t>Flask ROUTES</a:t>
+              <a:t>7 Flask ROUTES</a:t>
             </a:r>
           </a:p>
         </p:txBody>
@@ -7125,8 +7176,8 @@
         </p:nvSpPr>
         <p:spPr>
           <a:xfrm>
-            <a:off x="1467090" y="3221764"/>
-            <a:ext cx="5249903" cy="890542"/>
+            <a:off x="1837346" y="3221764"/>
+            <a:ext cx="4879647" cy="890542"/>
           </a:xfrm>
           <a:prstGeom prst="roundRect">
             <a:avLst/>
@@ -7156,7 +7207,7 @@
             <a:pPr algn="ctr"/>
             <a:r>
               <a:rPr lang="en-US" sz="4000" dirty="0"/>
-              <a:t>1 data route per visual</a:t>
+              <a:t>Data for visualizations</a:t>
             </a:r>
             <a:endParaRPr lang="en-US" sz="1600" dirty="0"/>
           </a:p>
@@ -7371,8 +7422,8 @@
         </p:nvSpPr>
         <p:spPr>
           <a:xfrm>
-            <a:off x="3666615" y="4489428"/>
-            <a:ext cx="3050377" cy="890542"/>
+            <a:off x="5067656" y="4489428"/>
+            <a:ext cx="1649337" cy="890542"/>
           </a:xfrm>
           <a:prstGeom prst="roundRect">
             <a:avLst/>
@@ -7449,6 +7500,92 @@
           <a:prstGeom prst="rect">
             <a:avLst/>
           </a:prstGeom>
+        </p:spPr>
+      </p:pic>
+      <p:pic>
+        <p:nvPicPr>
+          <p:cNvPr id="3" name="Graphic 2" descr="Body builder with solid fill">
+            <a:extLst>
+              <a:ext uri="{FF2B5EF4-FFF2-40B4-BE49-F238E27FC236}">
+                <a16:creationId xmlns:a16="http://schemas.microsoft.com/office/drawing/2014/main" id="{9CFCBE38-6E9F-EAB3-B6F5-E43C72BCB964}"/>
+              </a:ext>
+            </a:extLst>
+          </p:cNvPr>
+          <p:cNvPicPr>
+            <a:picLocks noChangeAspect="1"/>
+          </p:cNvPicPr>
+          <p:nvPr/>
+        </p:nvPicPr>
+        <p:blipFill>
+          <a:blip r:embed="rId2">
+            <a:extLst>
+              <a:ext uri="{28A0092B-C50C-407E-A947-70E740481C1C}">
+                <a14:useLocalDpi xmlns:a14="http://schemas.microsoft.com/office/drawing/2010/main" val="0"/>
+              </a:ext>
+              <a:ext uri="{96DAC541-7B7A-43D3-8B79-37D633B846F1}">
+                <asvg:svgBlip xmlns:asvg="http://schemas.microsoft.com/office/drawing/2016/SVG/main" r:embed="rId3"/>
+              </a:ext>
+            </a:extLst>
+          </a:blip>
+          <a:stretch>
+            <a:fillRect/>
+          </a:stretch>
+        </p:blipFill>
+        <p:spPr>
+          <a:xfrm>
+            <a:off x="10804394" y="3209835"/>
+            <a:ext cx="914400" cy="914400"/>
+          </a:xfrm>
+          <a:prstGeom prst="rect">
+            <a:avLst/>
+          </a:prstGeom>
+        </p:spPr>
+      </p:pic>
+      <p:pic>
+        <p:nvPicPr>
+          <p:cNvPr id="3074" name="Picture 2" descr="Look ma, no schema – Abhirama's Blog">
+            <a:extLst>
+              <a:ext uri="{FF2B5EF4-FFF2-40B4-BE49-F238E27FC236}">
+                <a16:creationId xmlns:a16="http://schemas.microsoft.com/office/drawing/2014/main" id="{5F9E803B-9212-5978-F001-89F9CB5692F3}"/>
+              </a:ext>
+            </a:extLst>
+          </p:cNvPr>
+          <p:cNvPicPr>
+            <a:picLocks noChangeAspect="1" noChangeArrowheads="1"/>
+          </p:cNvPicPr>
+          <p:nvPr/>
+        </p:nvPicPr>
+        <p:blipFill>
+          <a:blip r:embed="rId6">
+            <a:extLst>
+              <a:ext uri="{28A0092B-C50C-407E-A947-70E740481C1C}">
+                <a14:useLocalDpi xmlns:a14="http://schemas.microsoft.com/office/drawing/2010/main" val="0"/>
+              </a:ext>
+            </a:extLst>
+          </a:blip>
+          <a:srcRect/>
+          <a:stretch>
+            <a:fillRect/>
+          </a:stretch>
+        </p:blipFill>
+        <p:spPr bwMode="auto">
+          <a:xfrm>
+            <a:off x="261669" y="2918783"/>
+            <a:ext cx="1546787" cy="1546787"/>
+          </a:xfrm>
+          <a:prstGeom prst="rect">
+            <a:avLst/>
+          </a:prstGeom>
+          <a:noFill/>
+          <a:extLst>
+            <a:ext uri="{909E8E84-426E-40DD-AFC4-6F175D3DCCD1}">
+              <a14:hiddenFill xmlns:a14="http://schemas.microsoft.com/office/drawing/2010/main">
+                <a:solidFill>
+                  <a:srgbClr val="FFFFFF"/>
+                </a:solidFill>
+              </a14:hiddenFill>
+            </a:ext>
+          </a:extLst>
         </p:spPr>
       </p:pic>
     </p:spTree>
@@ -7537,38 +7674,8 @@
         </p:blipFill>
         <p:spPr>
           <a:xfrm>
-            <a:off x="153414" y="1136591"/>
+            <a:off x="469609" y="1136591"/>
             <a:ext cx="7219167" cy="3803770"/>
-          </a:xfrm>
-          <a:prstGeom prst="rect">
-            <a:avLst/>
-          </a:prstGeom>
-        </p:spPr>
-      </p:pic>
-      <p:pic>
-        <p:nvPicPr>
-          <p:cNvPr id="7" name="Picture 6">
-            <a:extLst>
-              <a:ext uri="{FF2B5EF4-FFF2-40B4-BE49-F238E27FC236}">
-                <a16:creationId xmlns:a16="http://schemas.microsoft.com/office/drawing/2014/main" id="{CDE37C0B-F6EF-C1D0-4068-08192DCC51E4}"/>
-              </a:ext>
-            </a:extLst>
-          </p:cNvPr>
-          <p:cNvPicPr>
-            <a:picLocks noChangeAspect="1"/>
-          </p:cNvPicPr>
-          <p:nvPr/>
-        </p:nvPicPr>
-        <p:blipFill>
-          <a:blip r:embed="rId3"/>
-          <a:stretch>
-            <a:fillRect/>
-          </a:stretch>
-        </p:blipFill>
-        <p:spPr>
-          <a:xfrm>
-            <a:off x="7650951" y="1136591"/>
-            <a:ext cx="4126123" cy="3803770"/>
           </a:xfrm>
           <a:prstGeom prst="rect">
             <a:avLst/>
@@ -7590,6 +7697,36 @@
           <p:nvPr/>
         </p:nvPicPr>
         <p:blipFill>
+          <a:blip r:embed="rId3"/>
+          <a:stretch>
+            <a:fillRect/>
+          </a:stretch>
+        </p:blipFill>
+        <p:spPr>
+          <a:xfrm>
+            <a:off x="1337597" y="5297487"/>
+            <a:ext cx="9516803" cy="847843"/>
+          </a:xfrm>
+          <a:prstGeom prst="rect">
+            <a:avLst/>
+          </a:prstGeom>
+        </p:spPr>
+      </p:pic>
+      <p:pic>
+        <p:nvPicPr>
+          <p:cNvPr id="4" name="Picture 3">
+            <a:extLst>
+              <a:ext uri="{FF2B5EF4-FFF2-40B4-BE49-F238E27FC236}">
+                <a16:creationId xmlns:a16="http://schemas.microsoft.com/office/drawing/2014/main" id="{169FAB61-8B67-8922-2395-6A5BA4FA38AF}"/>
+              </a:ext>
+            </a:extLst>
+          </p:cNvPr>
+          <p:cNvPicPr>
+            <a:picLocks noChangeAspect="1"/>
+          </p:cNvPicPr>
+          <p:nvPr/>
+        </p:nvPicPr>
+        <p:blipFill>
           <a:blip r:embed="rId4"/>
           <a:stretch>
             <a:fillRect/>
@@ -7597,8 +7734,8 @@
         </p:blipFill>
         <p:spPr>
           <a:xfrm>
-            <a:off x="1337597" y="5297487"/>
-            <a:ext cx="9516803" cy="847843"/>
+            <a:off x="7845408" y="1136591"/>
+            <a:ext cx="3537125" cy="3803770"/>
           </a:xfrm>
           <a:prstGeom prst="rect">
             <a:avLst/>
@@ -7769,77 +7906,160 @@
           </a:p>
         </p:txBody>
       </p:sp>
-      <p:sp>
-        <p:nvSpPr>
-          <p:cNvPr id="5" name="Rectangle: Rounded Corners 4">
+      <p:pic>
+        <p:nvPicPr>
+          <p:cNvPr id="7" name="Picture 6">
             <a:extLst>
               <a:ext uri="{FF2B5EF4-FFF2-40B4-BE49-F238E27FC236}">
-                <a16:creationId xmlns:a16="http://schemas.microsoft.com/office/drawing/2014/main" id="{EF26DC08-B919-927F-6A3A-52E2EF3440A2}"/>
+                <a16:creationId xmlns:a16="http://schemas.microsoft.com/office/drawing/2014/main" id="{CA53C629-648F-6054-8F33-379BEED64E80}"/>
               </a:ext>
             </a:extLst>
           </p:cNvPr>
-          <p:cNvSpPr/>
+          <p:cNvPicPr>
+            <a:picLocks noChangeAspect="1"/>
+          </p:cNvPicPr>
           <p:nvPr/>
-        </p:nvSpPr>
-        <p:spPr>
-          <a:xfrm>
-            <a:off x="3268565" y="1716324"/>
-            <a:ext cx="5654868" cy="2915495"/>
-          </a:xfrm>
-          <a:prstGeom prst="roundRect">
+        </p:nvPicPr>
+        <p:blipFill>
+          <a:blip r:embed="rId2"/>
+          <a:stretch>
+            <a:fillRect/>
+          </a:stretch>
+        </p:blipFill>
+        <p:spPr>
+          <a:xfrm>
+            <a:off x="6959124" y="2378716"/>
+            <a:ext cx="3543795" cy="1228896"/>
+          </a:xfrm>
+          <a:prstGeom prst="rect">
+            <a:avLst/>
+          </a:prstGeom>
+        </p:spPr>
+      </p:pic>
+      <p:pic>
+        <p:nvPicPr>
+          <p:cNvPr id="2058" name="Picture 10">
+            <a:extLst>
+              <a:ext uri="{FF2B5EF4-FFF2-40B4-BE49-F238E27FC236}">
+                <a16:creationId xmlns:a16="http://schemas.microsoft.com/office/drawing/2014/main" id="{50418987-1E34-195C-03CE-B0813DCE8F8F}"/>
+              </a:ext>
+            </a:extLst>
+          </p:cNvPr>
+          <p:cNvPicPr>
+            <a:picLocks noChangeAspect="1" noChangeArrowheads="1"/>
+          </p:cNvPicPr>
+          <p:nvPr/>
+        </p:nvPicPr>
+        <p:blipFill>
+          <a:blip r:embed="rId3">
+            <a:extLst>
+              <a:ext uri="{28A0092B-C50C-407E-A947-70E740481C1C}">
+                <a14:useLocalDpi xmlns:a14="http://schemas.microsoft.com/office/drawing/2010/main" val="0"/>
+              </a:ext>
+            </a:extLst>
+          </a:blip>
+          <a:srcRect/>
+          <a:stretch>
+            <a:fillRect/>
+          </a:stretch>
+        </p:blipFill>
+        <p:spPr bwMode="auto">
+          <a:xfrm rot="2704312">
+            <a:off x="3940324" y="1696340"/>
+            <a:ext cx="2593649" cy="2593649"/>
+          </a:xfrm>
+          <a:prstGeom prst="rect">
             <a:avLst/>
           </a:prstGeom>
           <a:noFill/>
-        </p:spPr>
-        <p:style>
-          <a:lnRef idx="2">
-            <a:schemeClr val="accent1">
-              <a:shade val="50000"/>
-            </a:schemeClr>
-          </a:lnRef>
-          <a:fillRef idx="1">
-            <a:schemeClr val="accent1"/>
-          </a:fillRef>
-          <a:effectRef idx="0">
-            <a:schemeClr val="accent1"/>
-          </a:effectRef>
-          <a:fontRef idx="minor">
-            <a:schemeClr val="lt1"/>
-          </a:fontRef>
-        </p:style>
-        <p:txBody>
-          <a:bodyPr rtlCol="0" anchor="ctr"/>
-          <a:lstStyle/>
-          <a:p>
-            <a:pPr marL="457200" indent="-457200">
-              <a:buFont typeface="Arial" panose="020B0604020202020204" pitchFamily="34" charset="0"/>
-              <a:buChar char="•"/>
-            </a:pPr>
-            <a:r>
-              <a:rPr lang="en-US" sz="3200" dirty="0">
-                <a:solidFill>
-                  <a:srgbClr val="FFC000"/>
-                </a:solidFill>
-              </a:rPr>
-              <a:t>Transforming data to the format expected by ECharts</a:t>
-            </a:r>
-          </a:p>
-          <a:p>
-            <a:pPr marL="457200" indent="-457200">
-              <a:buFont typeface="Arial" panose="020B0604020202020204" pitchFamily="34" charset="0"/>
-              <a:buChar char="•"/>
-            </a:pPr>
-            <a:r>
-              <a:rPr lang="en-US" sz="3200" dirty="0">
-                <a:solidFill>
-                  <a:srgbClr val="FFC000"/>
-                </a:solidFill>
-              </a:rPr>
-              <a:t>Understanding HTML, CSS, JS, Flask interaction</a:t>
-            </a:r>
-          </a:p>
-        </p:txBody>
-      </p:sp>
+          <a:extLst>
+            <a:ext uri="{909E8E84-426E-40DD-AFC4-6F175D3DCCD1}">
+              <a14:hiddenFill xmlns:a14="http://schemas.microsoft.com/office/drawing/2010/main">
+                <a:solidFill>
+                  <a:srgbClr val="FFFFFF"/>
+                </a:solidFill>
+              </a14:hiddenFill>
+            </a:ext>
+          </a:extLst>
+        </p:spPr>
+      </p:pic>
+      <p:pic>
+        <p:nvPicPr>
+          <p:cNvPr id="8" name="Picture 10" descr="Presentazione Aziendale - Mongo DB — Direzione aziendale - Laurea  Magistrale - Bologna">
+            <a:extLst>
+              <a:ext uri="{FF2B5EF4-FFF2-40B4-BE49-F238E27FC236}">
+                <a16:creationId xmlns:a16="http://schemas.microsoft.com/office/drawing/2014/main" id="{78D714D9-F598-4BE4-C3C5-5D1088C08AEC}"/>
+              </a:ext>
+            </a:extLst>
+          </p:cNvPr>
+          <p:cNvPicPr>
+            <a:picLocks noChangeAspect="1" noChangeArrowheads="1"/>
+          </p:cNvPicPr>
+          <p:nvPr/>
+        </p:nvPicPr>
+        <p:blipFill>
+          <a:blip r:embed="rId4">
+            <a:extLst>
+              <a:ext uri="{28A0092B-C50C-407E-A947-70E740481C1C}">
+                <a14:useLocalDpi xmlns:a14="http://schemas.microsoft.com/office/drawing/2010/main" val="0"/>
+              </a:ext>
+            </a:extLst>
+          </a:blip>
+          <a:srcRect/>
+          <a:stretch>
+            <a:fillRect/>
+          </a:stretch>
+        </p:blipFill>
+        <p:spPr bwMode="auto">
+          <a:xfrm>
+            <a:off x="1798715" y="1935741"/>
+            <a:ext cx="2114846" cy="2114846"/>
+          </a:xfrm>
+          <a:prstGeom prst="rect">
+            <a:avLst/>
+          </a:prstGeom>
+          <a:noFill/>
+          <a:extLst>
+            <a:ext uri="{909E8E84-426E-40DD-AFC4-6F175D3DCCD1}">
+              <a14:hiddenFill xmlns:a14="http://schemas.microsoft.com/office/drawing/2010/main">
+                <a:solidFill>
+                  <a:srgbClr val="FFFFFF"/>
+                </a:solidFill>
+              </a14:hiddenFill>
+            </a:ext>
+          </a:extLst>
+        </p:spPr>
+      </p:pic>
+      <p:pic>
+        <p:nvPicPr>
+          <p:cNvPr id="10" name="Picture 9">
+            <a:extLst>
+              <a:ext uri="{FF2B5EF4-FFF2-40B4-BE49-F238E27FC236}">
+                <a16:creationId xmlns:a16="http://schemas.microsoft.com/office/drawing/2014/main" id="{DF0B7F95-E980-78C6-0F59-406C30F2E424}"/>
+              </a:ext>
+            </a:extLst>
+          </p:cNvPr>
+          <p:cNvPicPr>
+            <a:picLocks noChangeAspect="1"/>
+          </p:cNvPicPr>
+          <p:nvPr/>
+        </p:nvPicPr>
+        <p:blipFill>
+          <a:blip r:embed="rId5"/>
+          <a:stretch>
+            <a:fillRect/>
+          </a:stretch>
+        </p:blipFill>
+        <p:spPr>
+          <a:xfrm>
+            <a:off x="4950618" y="4827150"/>
+            <a:ext cx="2290762" cy="1211406"/>
+          </a:xfrm>
+          <a:prstGeom prst="rect">
+            <a:avLst/>
+          </a:prstGeom>
+        </p:spPr>
+      </p:pic>
     </p:spTree>
     <p:extLst>
       <p:ext uri="{BB962C8B-B14F-4D97-AF65-F5344CB8AC3E}">
@@ -7904,61 +8124,51 @@
           </a:p>
         </p:txBody>
       </p:sp>
-      <p:sp>
-        <p:nvSpPr>
-          <p:cNvPr id="5" name="Rectangle: Rounded Corners 4">
+      <p:pic>
+        <p:nvPicPr>
+          <p:cNvPr id="4098" name="Picture 2" descr="Collecting additional data | Theory">
             <a:extLst>
               <a:ext uri="{FF2B5EF4-FFF2-40B4-BE49-F238E27FC236}">
-                <a16:creationId xmlns:a16="http://schemas.microsoft.com/office/drawing/2014/main" id="{EF26DC08-B919-927F-6A3A-52E2EF3440A2}"/>
+                <a16:creationId xmlns:a16="http://schemas.microsoft.com/office/drawing/2014/main" id="{E5CDDD7B-C6C6-7B03-A799-488B52075E72}"/>
               </a:ext>
             </a:extLst>
           </p:cNvPr>
-          <p:cNvSpPr/>
+          <p:cNvPicPr>
+            <a:picLocks noChangeAspect="1" noChangeArrowheads="1"/>
+          </p:cNvPicPr>
           <p:nvPr/>
-        </p:nvSpPr>
-        <p:spPr>
-          <a:xfrm>
-            <a:off x="3443156" y="1690688"/>
-            <a:ext cx="5305688" cy="2035328"/>
-          </a:xfrm>
-          <a:prstGeom prst="roundRect">
+        </p:nvPicPr>
+        <p:blipFill rotWithShape="1">
+          <a:blip r:embed="rId2">
+            <a:extLst>
+              <a:ext uri="{28A0092B-C50C-407E-A947-70E740481C1C}">
+                <a14:useLocalDpi xmlns:a14="http://schemas.microsoft.com/office/drawing/2010/main" val="0"/>
+              </a:ext>
+            </a:extLst>
+          </a:blip>
+          <a:srcRect t="20369" b="-20369"/>
+          <a:stretch/>
+        </p:blipFill>
+        <p:spPr bwMode="auto">
+          <a:xfrm>
+            <a:off x="4667249" y="2130467"/>
+            <a:ext cx="2857500" cy="3333750"/>
+          </a:xfrm>
+          <a:prstGeom prst="rect">
             <a:avLst/>
           </a:prstGeom>
           <a:noFill/>
-        </p:spPr>
-        <p:style>
-          <a:lnRef idx="2">
-            <a:schemeClr val="accent1">
-              <a:shade val="50000"/>
-            </a:schemeClr>
-          </a:lnRef>
-          <a:fillRef idx="1">
-            <a:schemeClr val="accent1"/>
-          </a:fillRef>
-          <a:effectRef idx="0">
-            <a:schemeClr val="accent1"/>
-          </a:effectRef>
-          <a:fontRef idx="minor">
-            <a:schemeClr val="lt1"/>
-          </a:fontRef>
-        </p:style>
-        <p:txBody>
-          <a:bodyPr rtlCol="0" anchor="ctr"/>
-          <a:lstStyle/>
-          <a:p>
-            <a:pPr algn="ctr"/>
-            <a:r>
-              <a:rPr lang="en-US" sz="3200" dirty="0">
-                <a:solidFill>
-                  <a:srgbClr val="FFC000"/>
-                </a:solidFill>
-              </a:rPr>
-              <a:t>Get data for 2018-2022 including effects of COVID-19</a:t>
-            </a:r>
-            <a:endParaRPr lang="en-US" sz="1200" dirty="0"/>
-          </a:p>
-        </p:txBody>
-      </p:sp>
+          <a:extLst>
+            <a:ext uri="{909E8E84-426E-40DD-AFC4-6F175D3DCCD1}">
+              <a14:hiddenFill xmlns:a14="http://schemas.microsoft.com/office/drawing/2010/main">
+                <a:solidFill>
+                  <a:srgbClr val="FFFFFF"/>
+                </a:solidFill>
+              </a14:hiddenFill>
+            </a:ext>
+          </a:extLst>
+        </p:spPr>
+      </p:pic>
     </p:spTree>
     <p:extLst>
       <p:ext uri="{BB962C8B-B14F-4D97-AF65-F5344CB8AC3E}">

</xml_diff>

<commit_message>
boxplot and presentation updates
</commit_message>
<xml_diff>
--- a/Presentation/project_03_group_04.pptx
+++ b/Presentation/project_03_group_04.pptx
@@ -6216,7 +6216,11 @@
           <a:lstStyle/>
           <a:p>
             <a:r>
-              <a:rPr lang="en-US" sz="6000" b="1" dirty="0"/>
+              <a:rPr lang="en-US" sz="6000" b="1" dirty="0">
+                <a:solidFill>
+                  <a:srgbClr val="FFC000"/>
+                </a:solidFill>
+              </a:rPr>
               <a:t>DEATH!</a:t>
             </a:r>
           </a:p>
@@ -6575,7 +6579,12 @@
             <p:ph type="title"/>
           </p:nvPr>
         </p:nvSpPr>
-        <p:spPr/>
+        <p:spPr>
+          <a:xfrm>
+            <a:off x="1030286" y="592508"/>
+            <a:ext cx="10131425" cy="1456267"/>
+          </a:xfrm>
+        </p:spPr>
         <p:txBody>
           <a:bodyPr/>
           <a:lstStyle/>
@@ -6633,9 +6642,45 @@
             <a:pPr algn="ctr"/>
             <a:r>
               <a:rPr lang="en-US" sz="6600" dirty="0"/>
-              <a:t>Visualize top 10 causes of death by US State over time</a:t>
-            </a:r>
-            <a:endParaRPr lang="en-US" sz="3200" dirty="0"/>
+              <a:t>Visualize </a:t>
+            </a:r>
+            <a:r>
+              <a:rPr lang="en-US" sz="6600" dirty="0">
+                <a:solidFill>
+                  <a:srgbClr val="FFC000"/>
+                </a:solidFill>
+              </a:rPr>
+              <a:t>top 10</a:t>
+            </a:r>
+            <a:r>
+              <a:rPr lang="en-US" sz="6600" dirty="0"/>
+              <a:t> causes of death by </a:t>
+            </a:r>
+            <a:r>
+              <a:rPr lang="en-US" sz="6600" dirty="0">
+                <a:solidFill>
+                  <a:srgbClr val="FFC000"/>
+                </a:solidFill>
+              </a:rPr>
+              <a:t>US State </a:t>
+            </a:r>
+            <a:r>
+              <a:rPr lang="en-US" sz="6600" dirty="0"/>
+              <a:t>over </a:t>
+            </a:r>
+            <a:r>
+              <a:rPr lang="en-US" sz="6600" dirty="0">
+                <a:solidFill>
+                  <a:srgbClr val="FFC000"/>
+                </a:solidFill>
+              </a:rPr>
+              <a:t>time</a:t>
+            </a:r>
+            <a:endParaRPr lang="en-US" sz="3200" dirty="0">
+              <a:solidFill>
+                <a:srgbClr val="FFC000"/>
+              </a:solidFill>
+            </a:endParaRPr>
           </a:p>
         </p:txBody>
       </p:sp>
@@ -6713,10 +6758,18 @@
           <a:p>
             <a:pPr algn="ctr"/>
             <a:r>
-              <a:rPr lang="en-US" sz="6600" dirty="0"/>
+              <a:rPr lang="en-US" sz="6600" dirty="0">
+                <a:solidFill>
+                  <a:srgbClr val="FFC000"/>
+                </a:solidFill>
+              </a:rPr>
               <a:t>Demo</a:t>
             </a:r>
-            <a:endParaRPr lang="en-US" sz="3200" dirty="0"/>
+            <a:endParaRPr lang="en-US" sz="3200" dirty="0">
+              <a:solidFill>
+                <a:srgbClr val="FFC000"/>
+              </a:solidFill>
+            </a:endParaRPr>
           </a:p>
         </p:txBody>
       </p:sp>
@@ -6798,7 +6851,7 @@
         </p:nvSpPr>
         <p:spPr>
           <a:xfrm>
-            <a:off x="3698030" y="2782426"/>
+            <a:off x="4128005" y="2782426"/>
             <a:ext cx="538385" cy="435835"/>
           </a:xfrm>
           <a:prstGeom prst="rightArrow">
@@ -6844,7 +6897,7 @@
         </p:nvSpPr>
         <p:spPr>
           <a:xfrm>
-            <a:off x="7927106" y="2782426"/>
+            <a:off x="7525608" y="2782426"/>
             <a:ext cx="538385" cy="435835"/>
           </a:xfrm>
           <a:prstGeom prst="rightArrow">
@@ -6898,7 +6951,7 @@
         </p:blipFill>
         <p:spPr>
           <a:xfrm>
-            <a:off x="3361942" y="4268341"/>
+            <a:off x="1631416" y="4313016"/>
             <a:ext cx="5468113" cy="2114845"/>
           </a:xfrm>
           <a:prstGeom prst="rect">
@@ -6935,7 +6988,7 @@
         </p:blipFill>
         <p:spPr bwMode="auto">
           <a:xfrm>
-            <a:off x="1507456" y="1780076"/>
+            <a:off x="1607830" y="1780076"/>
             <a:ext cx="1754112" cy="2004700"/>
           </a:xfrm>
           <a:prstGeom prst="rect">
@@ -6955,10 +7008,10 @@
       </p:pic>
       <p:pic>
         <p:nvPicPr>
-          <p:cNvPr id="1028" name="Picture 4" descr="JSON Parsing in JAVA: Base of Analytics Testing In Automation">
+          <p:cNvPr id="1034" name="Picture 10" descr="Presentazione Aziendale - Mongo DB — Direzione aziendale - Laurea  Magistrale - Bologna">
             <a:extLst>
               <a:ext uri="{FF2B5EF4-FFF2-40B4-BE49-F238E27FC236}">
-                <a16:creationId xmlns:a16="http://schemas.microsoft.com/office/drawing/2014/main" id="{92AFD8B6-94BA-C312-CE0A-07DB3FC1830C}"/>
+                <a16:creationId xmlns:a16="http://schemas.microsoft.com/office/drawing/2014/main" id="{A89A8B8F-3D07-BCD7-CFDF-295151EF3DF3}"/>
               </a:ext>
             </a:extLst>
           </p:cNvPr>
@@ -6982,8 +7035,8 @@
         </p:blipFill>
         <p:spPr bwMode="auto">
           <a:xfrm>
-            <a:off x="4574846" y="2445611"/>
-            <a:ext cx="3042303" cy="1117096"/>
+            <a:off x="8490073" y="1780076"/>
+            <a:ext cx="2114846" cy="2114846"/>
           </a:xfrm>
           <a:prstGeom prst="rect">
             <a:avLst/>
@@ -7002,10 +7055,10 @@
       </p:pic>
       <p:pic>
         <p:nvPicPr>
-          <p:cNvPr id="1034" name="Picture 10" descr="Presentazione Aziendale - Mongo DB — Direzione aziendale - Laurea  Magistrale - Bologna">
+          <p:cNvPr id="3" name="Picture 2" descr="Json file - Free interface icons">
             <a:extLst>
               <a:ext uri="{FF2B5EF4-FFF2-40B4-BE49-F238E27FC236}">
-                <a16:creationId xmlns:a16="http://schemas.microsoft.com/office/drawing/2014/main" id="{A89A8B8F-3D07-BCD7-CFDF-295151EF3DF3}"/>
+                <a16:creationId xmlns:a16="http://schemas.microsoft.com/office/drawing/2014/main" id="{61CA30E7-34A7-8374-3BA3-E2AD91D21A7D}"/>
               </a:ext>
             </a:extLst>
           </p:cNvPr>
@@ -7029,8 +7082,8 @@
         </p:blipFill>
         <p:spPr bwMode="auto">
           <a:xfrm>
-            <a:off x="8490073" y="1780076"/>
-            <a:ext cx="2114846" cy="2114846"/>
+            <a:off x="5092470" y="1780075"/>
+            <a:ext cx="2007059" cy="2007059"/>
           </a:xfrm>
           <a:prstGeom prst="rect">
             <a:avLst/>
@@ -7047,6 +7100,99 @@
           </a:extLst>
         </p:spPr>
       </p:pic>
+      <p:pic>
+        <p:nvPicPr>
+          <p:cNvPr id="1030" name="Picture 6" descr="GeoJSON - LuminFire">
+            <a:extLst>
+              <a:ext uri="{FF2B5EF4-FFF2-40B4-BE49-F238E27FC236}">
+                <a16:creationId xmlns:a16="http://schemas.microsoft.com/office/drawing/2014/main" id="{CCD31F40-9670-D372-4E93-43CFDA2B67F0}"/>
+              </a:ext>
+            </a:extLst>
+          </p:cNvPr>
+          <p:cNvPicPr>
+            <a:picLocks noChangeAspect="1" noChangeArrowheads="1"/>
+          </p:cNvPicPr>
+          <p:nvPr/>
+        </p:nvPicPr>
+        <p:blipFill>
+          <a:blip r:embed="rId6">
+            <a:extLst>
+              <a:ext uri="{28A0092B-C50C-407E-A947-70E740481C1C}">
+                <a14:useLocalDpi xmlns:a14="http://schemas.microsoft.com/office/drawing/2010/main" val="0"/>
+              </a:ext>
+            </a:extLst>
+          </a:blip>
+          <a:srcRect/>
+          <a:stretch>
+            <a:fillRect/>
+          </a:stretch>
+        </p:blipFill>
+        <p:spPr bwMode="auto">
+          <a:xfrm>
+            <a:off x="8490073" y="4686223"/>
+            <a:ext cx="1905000" cy="1905000"/>
+          </a:xfrm>
+          <a:prstGeom prst="rect">
+            <a:avLst/>
+          </a:prstGeom>
+          <a:noFill/>
+          <a:extLst>
+            <a:ext uri="{909E8E84-426E-40DD-AFC4-6F175D3DCCD1}">
+              <a14:hiddenFill xmlns:a14="http://schemas.microsoft.com/office/drawing/2010/main">
+                <a:solidFill>
+                  <a:srgbClr val="FFFFFF"/>
+                </a:solidFill>
+              </a14:hiddenFill>
+            </a:ext>
+          </a:extLst>
+        </p:spPr>
+      </p:pic>
+      <p:sp>
+        <p:nvSpPr>
+          <p:cNvPr id="5" name="Arrow: Right 4">
+            <a:extLst>
+              <a:ext uri="{FF2B5EF4-FFF2-40B4-BE49-F238E27FC236}">
+                <a16:creationId xmlns:a16="http://schemas.microsoft.com/office/drawing/2014/main" id="{F8350DFC-C377-545D-2F17-E27020CEC355}"/>
+              </a:ext>
+            </a:extLst>
+          </p:cNvPr>
+          <p:cNvSpPr/>
+          <p:nvPr/>
+        </p:nvSpPr>
+        <p:spPr>
+          <a:xfrm rot="16200000">
+            <a:off x="9278303" y="4072655"/>
+            <a:ext cx="538385" cy="435835"/>
+          </a:xfrm>
+          <a:prstGeom prst="rightArrow">
+            <a:avLst/>
+          </a:prstGeom>
+        </p:spPr>
+        <p:style>
+          <a:lnRef idx="2">
+            <a:schemeClr val="accent1">
+              <a:shade val="15000"/>
+            </a:schemeClr>
+          </a:lnRef>
+          <a:fillRef idx="1">
+            <a:schemeClr val="accent1"/>
+          </a:fillRef>
+          <a:effectRef idx="0">
+            <a:schemeClr val="accent1"/>
+          </a:effectRef>
+          <a:fontRef idx="minor">
+            <a:schemeClr val="lt1"/>
+          </a:fontRef>
+        </p:style>
+        <p:txBody>
+          <a:bodyPr rtlCol="0" anchor="ctr"/>
+          <a:lstStyle/>
+          <a:p>
+            <a:pPr algn="ctr"/>
+            <a:endParaRPr lang="en-US" dirty="0"/>
+          </a:p>
+        </p:txBody>
+      </p:sp>
     </p:spTree>
     <p:extLst>
       <p:ext uri="{BB962C8B-B14F-4D97-AF65-F5344CB8AC3E}">
@@ -8052,8 +8198,37 @@
         </p:blipFill>
         <p:spPr>
           <a:xfrm>
-            <a:off x="4950618" y="4827150"/>
-            <a:ext cx="2290762" cy="1211406"/>
+            <a:off x="6599956" y="4848672"/>
+            <a:ext cx="2347491" cy="1241406"/>
+          </a:xfrm>
+          <a:prstGeom prst="rect">
+            <a:avLst/>
+          </a:prstGeom>
+        </p:spPr>
+      </p:pic>
+      <p:pic>
+        <p:nvPicPr>
+          <p:cNvPr id="5" name="Picture 4">
+            <a:extLst>
+              <a:ext uri="{FF2B5EF4-FFF2-40B4-BE49-F238E27FC236}">
+                <a16:creationId xmlns:a16="http://schemas.microsoft.com/office/drawing/2014/main" id="{D45E5450-0C9D-B84F-8A48-C67C5C5061E3}"/>
+              </a:ext>
+            </a:extLst>
+          </p:cNvPr>
+          <p:cNvPicPr>
+            <a:picLocks noChangeAspect="1"/>
+          </p:cNvPicPr>
+          <p:nvPr/>
+        </p:nvPicPr>
+        <p:blipFill rotWithShape="1">
+          <a:blip r:embed="rId6"/>
+          <a:srcRect t="5378" b="-5378"/>
+          <a:stretch/>
+        </p:blipFill>
+        <p:spPr>
+          <a:xfrm>
+            <a:off x="1485097" y="4846320"/>
+            <a:ext cx="4562475" cy="1314450"/>
           </a:xfrm>
           <a:prstGeom prst="rect">
             <a:avLst/>

</xml_diff>